<commit_message>
fix bug in definition of transitive...
</commit_message>
<xml_diff>
--- a/classes/prog2015/Prog3-Lecture8.pptx
+++ b/classes/prog2015/Prog3-Lecture8.pptx
@@ -247,7 +247,7 @@
             <a:fld id="{02EDA61E-6AEC-4C8A-ACC6-A4B93802AD74}" type="datetimeFigureOut">
               <a:rPr lang="en-US" smtClean="0"/>
               <a:pPr/>
-              <a:t>8/28/2014</a:t>
+              <a:t>10/6/2015</a:t>
             </a:fld>
             <a:endParaRPr lang="en-US"/>
           </a:p>
@@ -5269,7 +5269,7 @@
             <a:fld id="{1D8BD707-D9CF-40AE-B4C6-C98DA3205C09}" type="datetimeFigureOut">
               <a:rPr lang="en-US" smtClean="0"/>
               <a:pPr/>
-              <a:t>8/28/2014</a:t>
+              <a:t>10/6/2015</a:t>
             </a:fld>
             <a:endParaRPr lang="en-US"/>
           </a:p>
@@ -5436,7 +5436,7 @@
             <a:fld id="{1D8BD707-D9CF-40AE-B4C6-C98DA3205C09}" type="datetimeFigureOut">
               <a:rPr lang="en-US" smtClean="0"/>
               <a:pPr/>
-              <a:t>8/28/2014</a:t>
+              <a:t>10/6/2015</a:t>
             </a:fld>
             <a:endParaRPr lang="en-US"/>
           </a:p>
@@ -5613,7 +5613,7 @@
             <a:fld id="{1D8BD707-D9CF-40AE-B4C6-C98DA3205C09}" type="datetimeFigureOut">
               <a:rPr lang="en-US" smtClean="0"/>
               <a:pPr/>
-              <a:t>8/28/2014</a:t>
+              <a:t>10/6/2015</a:t>
             </a:fld>
             <a:endParaRPr lang="en-US"/>
           </a:p>
@@ -5780,7 +5780,7 @@
             <a:fld id="{1D8BD707-D9CF-40AE-B4C6-C98DA3205C09}" type="datetimeFigureOut">
               <a:rPr lang="en-US" smtClean="0"/>
               <a:pPr/>
-              <a:t>8/28/2014</a:t>
+              <a:t>10/6/2015</a:t>
             </a:fld>
             <a:endParaRPr lang="en-US"/>
           </a:p>
@@ -6023,7 +6023,7 @@
             <a:fld id="{1D8BD707-D9CF-40AE-B4C6-C98DA3205C09}" type="datetimeFigureOut">
               <a:rPr lang="en-US" smtClean="0"/>
               <a:pPr/>
-              <a:t>8/28/2014</a:t>
+              <a:t>10/6/2015</a:t>
             </a:fld>
             <a:endParaRPr lang="en-US"/>
           </a:p>
@@ -6308,7 +6308,7 @@
             <a:fld id="{1D8BD707-D9CF-40AE-B4C6-C98DA3205C09}" type="datetimeFigureOut">
               <a:rPr lang="en-US" smtClean="0"/>
               <a:pPr/>
-              <a:t>8/28/2014</a:t>
+              <a:t>10/6/2015</a:t>
             </a:fld>
             <a:endParaRPr lang="en-US"/>
           </a:p>
@@ -6727,7 +6727,7 @@
             <a:fld id="{1D8BD707-D9CF-40AE-B4C6-C98DA3205C09}" type="datetimeFigureOut">
               <a:rPr lang="en-US" smtClean="0"/>
               <a:pPr/>
-              <a:t>8/28/2014</a:t>
+              <a:t>10/6/2015</a:t>
             </a:fld>
             <a:endParaRPr lang="en-US"/>
           </a:p>
@@ -6842,7 +6842,7 @@
             <a:fld id="{1D8BD707-D9CF-40AE-B4C6-C98DA3205C09}" type="datetimeFigureOut">
               <a:rPr lang="en-US" smtClean="0"/>
               <a:pPr/>
-              <a:t>8/28/2014</a:t>
+              <a:t>10/6/2015</a:t>
             </a:fld>
             <a:endParaRPr lang="en-US"/>
           </a:p>
@@ -6934,7 +6934,7 @@
             <a:fld id="{1D8BD707-D9CF-40AE-B4C6-C98DA3205C09}" type="datetimeFigureOut">
               <a:rPr lang="en-US" smtClean="0"/>
               <a:pPr/>
-              <a:t>8/28/2014</a:t>
+              <a:t>10/6/2015</a:t>
             </a:fld>
             <a:endParaRPr lang="en-US"/>
           </a:p>
@@ -7208,7 +7208,7 @@
             <a:fld id="{1D8BD707-D9CF-40AE-B4C6-C98DA3205C09}" type="datetimeFigureOut">
               <a:rPr lang="en-US" smtClean="0"/>
               <a:pPr/>
-              <a:t>8/28/2014</a:t>
+              <a:t>10/6/2015</a:t>
             </a:fld>
             <a:endParaRPr lang="en-US"/>
           </a:p>
@@ -7458,7 +7458,7 @@
             <a:fld id="{1D8BD707-D9CF-40AE-B4C6-C98DA3205C09}" type="datetimeFigureOut">
               <a:rPr lang="en-US" smtClean="0"/>
               <a:pPr/>
-              <a:t>8/28/2014</a:t>
+              <a:t>10/6/2015</a:t>
             </a:fld>
             <a:endParaRPr lang="en-US"/>
           </a:p>
@@ -7668,7 +7668,7 @@
             <a:fld id="{1D8BD707-D9CF-40AE-B4C6-C98DA3205C09}" type="datetimeFigureOut">
               <a:rPr lang="en-US" smtClean="0"/>
               <a:pPr/>
-              <a:t>8/28/2014</a:t>
+              <a:t>10/6/2015</a:t>
             </a:fld>
             <a:endParaRPr lang="en-US"/>
           </a:p>
@@ -13427,7 +13427,7 @@
         <p:spPr bwMode="auto">
           <a:xfrm>
             <a:off x="974725" y="1266825"/>
-            <a:ext cx="7961313" cy="2647950"/>
+            <a:ext cx="5562228" cy="2031325"/>
           </a:xfrm>
           <a:prstGeom prst="rect">
             <a:avLst/>
@@ -13447,44 +13447,105 @@
           <a:lstStyle/>
           <a:p>
             <a:r>
-              <a:rPr lang="en-US"/>
-              <a:t>Reflexive:  x.equals(x) must be true</a:t>
-            </a:r>
-          </a:p>
-          <a:p>
-            <a:r>
-              <a:rPr lang="en-US"/>
-              <a:t>Symmetric: x.equals(y) must be the same as y.equals(x)</a:t>
-            </a:r>
-          </a:p>
-          <a:p>
-            <a:r>
-              <a:rPr lang="en-US"/>
-              <a:t>Transitive: x.equals(y) and y.equals(z) then x.equals(x)</a:t>
-            </a:r>
-          </a:p>
-          <a:p>
-            <a:r>
-              <a:rPr lang="en-US"/>
-              <a:t>Consistent:  equals should only chage if the state of </a:t>
-            </a:r>
-          </a:p>
-          <a:p>
-            <a:r>
-              <a:rPr lang="en-US"/>
+              <a:rPr lang="en-US" dirty="0"/>
+              <a:t>Reflexive:  </a:t>
+            </a:r>
+            <a:r>
+              <a:rPr lang="en-US" dirty="0" err="1"/>
+              <a:t>x.equals</a:t>
+            </a:r>
+            <a:r>
+              <a:rPr lang="en-US" dirty="0"/>
+              <a:t>(x) must be true</a:t>
+            </a:r>
+          </a:p>
+          <a:p>
+            <a:r>
+              <a:rPr lang="en-US" dirty="0"/>
+              <a:t>Symmetric: </a:t>
+            </a:r>
+            <a:r>
+              <a:rPr lang="en-US" dirty="0" err="1"/>
+              <a:t>x.equals</a:t>
+            </a:r>
+            <a:r>
+              <a:rPr lang="en-US" dirty="0"/>
+              <a:t>(y) must be the same as </a:t>
+            </a:r>
+            <a:r>
+              <a:rPr lang="en-US" dirty="0" err="1"/>
+              <a:t>y.equals</a:t>
+            </a:r>
+            <a:r>
+              <a:rPr lang="en-US" dirty="0"/>
+              <a:t>(x)</a:t>
+            </a:r>
+          </a:p>
+          <a:p>
+            <a:r>
+              <a:rPr lang="en-US" dirty="0"/>
+              <a:t>Transitive: </a:t>
+            </a:r>
+            <a:r>
+              <a:rPr lang="en-US" dirty="0" err="1"/>
+              <a:t>x.equals</a:t>
+            </a:r>
+            <a:r>
+              <a:rPr lang="en-US" dirty="0"/>
+              <a:t>(y) and </a:t>
+            </a:r>
+            <a:r>
+              <a:rPr lang="en-US" dirty="0" err="1"/>
+              <a:t>y.equals</a:t>
+            </a:r>
+            <a:r>
+              <a:rPr lang="en-US" dirty="0"/>
+              <a:t>(z) then </a:t>
+            </a:r>
+            <a:r>
+              <a:rPr lang="en-US" dirty="0" err="1" smtClean="0"/>
+              <a:t>x.equals</a:t>
+            </a:r>
+            <a:r>
+              <a:rPr lang="en-US" smtClean="0"/>
+              <a:t>(z)</a:t>
+            </a:r>
+            <a:endParaRPr lang="en-US" dirty="0"/>
+          </a:p>
+          <a:p>
+            <a:r>
+              <a:rPr lang="en-US" dirty="0"/>
+              <a:t>Consistent:  equals should only </a:t>
+            </a:r>
+            <a:r>
+              <a:rPr lang="en-US" dirty="0" err="1"/>
+              <a:t>chage</a:t>
+            </a:r>
+            <a:r>
+              <a:rPr lang="en-US" dirty="0"/>
+              <a:t> if the state of </a:t>
+            </a:r>
+          </a:p>
+          <a:p>
+            <a:r>
+              <a:rPr lang="en-US" dirty="0"/>
               <a:t>the objects changes.  Should never change for immutable</a:t>
             </a:r>
           </a:p>
           <a:p>
             <a:r>
-              <a:rPr lang="en-US"/>
+              <a:rPr lang="en-US" dirty="0"/>
               <a:t>objects.</a:t>
             </a:r>
           </a:p>
           <a:p>
             <a:r>
-              <a:rPr lang="en-US"/>
-              <a:t>x.equals(null) should return false for all non-null x.</a:t>
+              <a:rPr lang="en-US" dirty="0" err="1"/>
+              <a:t>x.equals</a:t>
+            </a:r>
+            <a:r>
+              <a:rPr lang="en-US" dirty="0"/>
+              <a:t>(null) should return false for all non-null x.</a:t>
             </a:r>
           </a:p>
         </p:txBody>
@@ -15083,11 +15144,7 @@
             </a:r>
             <a:r>
               <a:rPr lang="en-US" dirty="0" smtClean="0"/>
-              <a:t>may</a:t>
-            </a:r>
-            <a:r>
-              <a:rPr lang="en-US" dirty="0" smtClean="0"/>
-              <a:t> </a:t>
+              <a:t>may </a:t>
             </a:r>
             <a:r>
               <a:rPr lang="en-US" dirty="0"/>

</xml_diff>